<commit_message>
add stuff worked on on plane
</commit_message>
<xml_diff>
--- a/writeup/figures/stim_figure.pptx
+++ b/writeup/figures/stim_figure.pptx
@@ -8189,168 +8189,52 @@
           <a:chExt cx="0" cy="0"/>
         </a:xfrm>
       </p:grpSpPr>
-      <p:pic>
-        <p:nvPicPr>
-          <p:cNvPr id="6" name="Picture 5" descr="Screen Shot 2015-09-07 at 12.29.10 PM.png"/>
-          <p:cNvPicPr>
-            <a:picLocks noChangeAspect="1"/>
-          </p:cNvPicPr>
-          <p:nvPr/>
-        </p:nvPicPr>
-        <p:blipFill rotWithShape="1">
-          <a:blip r:embed="rId2">
-            <a:extLst>
-              <a:ext uri="{28A0092B-C50C-407E-A947-70E740481C1C}">
-                <a14:useLocalDpi xmlns:a14="http://schemas.microsoft.com/office/drawing/2010/main" val="0"/>
-              </a:ext>
-            </a:extLst>
-          </a:blip>
-          <a:srcRect l="28720" t="82744" r="35264"/>
-          <a:stretch/>
-        </p:blipFill>
-        <p:spPr>
-          <a:xfrm>
-            <a:off x="1187864" y="2477742"/>
-            <a:ext cx="1480179" cy="623855"/>
-          </a:xfrm>
-          <a:prstGeom prst="rect">
-            <a:avLst/>
-          </a:prstGeom>
-        </p:spPr>
-      </p:pic>
-      <p:pic>
-        <p:nvPicPr>
-          <p:cNvPr id="4" name="Picture 3" descr="Screen Shot 2015-09-07 at 12.29.10 PM.png"/>
-          <p:cNvPicPr>
-            <a:picLocks noChangeAspect="1"/>
-          </p:cNvPicPr>
-          <p:nvPr/>
-        </p:nvPicPr>
-        <p:blipFill rotWithShape="1">
-          <a:blip r:embed="rId2">
-            <a:extLst>
-              <a:ext uri="{28A0092B-C50C-407E-A947-70E740481C1C}">
-                <a14:useLocalDpi xmlns:a14="http://schemas.microsoft.com/office/drawing/2010/main" val="0"/>
-              </a:ext>
-            </a:extLst>
-          </a:blip>
-          <a:srcRect l="57854" t="10890" b="20724"/>
-          <a:stretch/>
-        </p:blipFill>
-        <p:spPr>
-          <a:xfrm>
-            <a:off x="1919422" y="372755"/>
-            <a:ext cx="1518535" cy="2167501"/>
-          </a:xfrm>
-          <a:prstGeom prst="rect">
-            <a:avLst/>
-          </a:prstGeom>
-        </p:spPr>
-      </p:pic>
-      <p:pic>
-        <p:nvPicPr>
-          <p:cNvPr id="5" name="Picture 4" descr="Screen Shot 2015-09-07 at 12.29.10 PM.png"/>
-          <p:cNvPicPr>
-            <a:picLocks noChangeAspect="1"/>
-          </p:cNvPicPr>
-          <p:nvPr/>
-        </p:nvPicPr>
-        <p:blipFill rotWithShape="1">
-          <a:blip r:embed="rId2">
-            <a:extLst>
-              <a:ext uri="{28A0092B-C50C-407E-A947-70E740481C1C}">
-                <a14:useLocalDpi xmlns:a14="http://schemas.microsoft.com/office/drawing/2010/main" val="0"/>
-              </a:ext>
-            </a:extLst>
-          </a:blip>
-          <a:srcRect l="3815" t="10889" r="52507" b="19870"/>
-          <a:stretch/>
-        </p:blipFill>
-        <p:spPr>
-          <a:xfrm>
-            <a:off x="469365" y="345679"/>
-            <a:ext cx="1573755" cy="2194577"/>
-          </a:xfrm>
-          <a:prstGeom prst="rect">
-            <a:avLst/>
-          </a:prstGeom>
-        </p:spPr>
-      </p:pic>
-      <p:pic>
-        <p:nvPicPr>
-          <p:cNvPr id="7" name="Picture 6" descr="Screen Shot 2015-09-07 at 1.31.47 PM.png"/>
-          <p:cNvPicPr>
-            <a:picLocks noChangeAspect="1"/>
-          </p:cNvPicPr>
-          <p:nvPr/>
-        </p:nvPicPr>
-        <p:blipFill rotWithShape="1">
-          <a:blip r:embed="rId3">
-            <a:extLst>
-              <a:ext uri="{28A0092B-C50C-407E-A947-70E740481C1C}">
-                <a14:useLocalDpi xmlns:a14="http://schemas.microsoft.com/office/drawing/2010/main" val="0"/>
-              </a:ext>
-            </a:extLst>
-          </a:blip>
-          <a:srcRect b="80472"/>
-          <a:stretch/>
-        </p:blipFill>
-        <p:spPr>
-          <a:xfrm>
-            <a:off x="4431760" y="1377379"/>
-            <a:ext cx="3147511" cy="397829"/>
-          </a:xfrm>
-          <a:prstGeom prst="rect">
-            <a:avLst/>
-          </a:prstGeom>
-        </p:spPr>
-      </p:pic>
-      <p:pic>
-        <p:nvPicPr>
-          <p:cNvPr id="8" name="Picture 7" descr="Screen Shot 2015-09-07 at 1.31.47 PM.png"/>
-          <p:cNvPicPr>
-            <a:picLocks noChangeAspect="1"/>
-          </p:cNvPicPr>
-          <p:nvPr/>
-        </p:nvPicPr>
-        <p:blipFill rotWithShape="1">
-          <a:blip r:embed="rId3">
-            <a:extLst>
-              <a:ext uri="{28A0092B-C50C-407E-A947-70E740481C1C}">
-                <a14:useLocalDpi xmlns:a14="http://schemas.microsoft.com/office/drawing/2010/main" val="0"/>
-              </a:ext>
-            </a:extLst>
-          </a:blip>
-          <a:srcRect l="37701" t="59894" r="39053" b="21826"/>
-          <a:stretch/>
-        </p:blipFill>
-        <p:spPr>
-          <a:xfrm>
-            <a:off x="5417621" y="2176521"/>
-            <a:ext cx="1055029" cy="536985"/>
-          </a:xfrm>
-          <a:prstGeom prst="rect">
-            <a:avLst/>
-          </a:prstGeom>
-        </p:spPr>
-      </p:pic>
       <p:grpSp>
         <p:nvGrpSpPr>
-          <p:cNvPr id="12" name="Group 11"/>
+          <p:cNvPr id="34" name="Group 33"/>
           <p:cNvGrpSpPr/>
           <p:nvPr/>
         </p:nvGrpSpPr>
         <p:grpSpPr>
           <a:xfrm>
-            <a:off x="5246396" y="372755"/>
-            <a:ext cx="1421355" cy="1050758"/>
-            <a:chOff x="621765" y="498079"/>
-            <a:chExt cx="2968592" cy="2194577"/>
+            <a:off x="438582" y="219509"/>
+            <a:ext cx="6867026" cy="3155834"/>
+            <a:chOff x="438582" y="219509"/>
+            <a:chExt cx="6867026" cy="3155834"/>
           </a:xfrm>
         </p:grpSpPr>
         <p:pic>
           <p:nvPicPr>
-            <p:cNvPr id="10" name="Picture 9" descr="Screen Shot 2015-09-07 at 12.29.10 PM.png"/>
+            <p:cNvPr id="6" name="Picture 5" descr="Screen Shot 2015-09-07 at 12.29.10 PM.png"/>
+            <p:cNvPicPr>
+              <a:picLocks noChangeAspect="1"/>
+            </p:cNvPicPr>
+            <p:nvPr/>
+          </p:nvPicPr>
+          <p:blipFill rotWithShape="1">
+            <a:blip r:embed="rId2">
+              <a:extLst>
+                <a:ext uri="{28A0092B-C50C-407E-A947-70E740481C1C}">
+                  <a14:useLocalDpi xmlns:a14="http://schemas.microsoft.com/office/drawing/2010/main" val="0"/>
+                </a:ext>
+              </a:extLst>
+            </a:blip>
+            <a:srcRect l="28720" t="82744" r="35264"/>
+            <a:stretch/>
+          </p:blipFill>
+          <p:spPr>
+            <a:xfrm>
+              <a:off x="1379741" y="2751488"/>
+              <a:ext cx="1480179" cy="623855"/>
+            </a:xfrm>
+            <a:prstGeom prst="rect">
+              <a:avLst/>
+            </a:prstGeom>
+          </p:spPr>
+        </p:pic>
+        <p:pic>
+          <p:nvPicPr>
+            <p:cNvPr id="4" name="Picture 3" descr="Screen Shot 2015-09-07 at 12.29.10 PM.png"/>
             <p:cNvPicPr>
               <a:picLocks noChangeAspect="1"/>
             </p:cNvPicPr>
@@ -8369,7 +8253,7 @@
           </p:blipFill>
           <p:spPr>
             <a:xfrm>
-              <a:off x="2071822" y="525155"/>
+              <a:off x="2111299" y="655637"/>
               <a:ext cx="1518535" cy="2167501"/>
             </a:xfrm>
             <a:prstGeom prst="rect">
@@ -8379,7 +8263,7 @@
         </p:pic>
         <p:pic>
           <p:nvPicPr>
-            <p:cNvPr id="11" name="Picture 10" descr="Screen Shot 2015-09-07 at 12.29.10 PM.png"/>
+            <p:cNvPr id="5" name="Picture 4" descr="Screen Shot 2015-09-07 at 12.29.10 PM.png"/>
             <p:cNvPicPr>
               <a:picLocks noChangeAspect="1"/>
             </p:cNvPicPr>
@@ -8398,7 +8282,7 @@
           </p:blipFill>
           <p:spPr>
             <a:xfrm>
-              <a:off x="621765" y="498079"/>
+              <a:off x="661242" y="628561"/>
               <a:ext cx="1573755" cy="2194577"/>
             </a:xfrm>
             <a:prstGeom prst="rect">
@@ -8406,143 +8290,434 @@
             </a:prstGeom>
           </p:spPr>
         </p:pic>
+        <p:pic>
+          <p:nvPicPr>
+            <p:cNvPr id="7" name="Picture 6" descr="Screen Shot 2015-09-07 at 1.31.47 PM.png"/>
+            <p:cNvPicPr>
+              <a:picLocks noChangeAspect="1"/>
+            </p:cNvPicPr>
+            <p:nvPr/>
+          </p:nvPicPr>
+          <p:blipFill rotWithShape="1">
+            <a:blip r:embed="rId3">
+              <a:extLst>
+                <a:ext uri="{28A0092B-C50C-407E-A947-70E740481C1C}">
+                  <a14:useLocalDpi xmlns:a14="http://schemas.microsoft.com/office/drawing/2010/main" val="0"/>
+                </a:ext>
+              </a:extLst>
+            </a:blip>
+            <a:srcRect b="80472"/>
+            <a:stretch/>
+          </p:blipFill>
+          <p:spPr>
+            <a:xfrm>
+              <a:off x="4114356" y="1651819"/>
+              <a:ext cx="3147511" cy="397829"/>
+            </a:xfrm>
+            <a:prstGeom prst="rect">
+              <a:avLst/>
+            </a:prstGeom>
+          </p:spPr>
+        </p:pic>
+        <p:pic>
+          <p:nvPicPr>
+            <p:cNvPr id="8" name="Picture 7" descr="Screen Shot 2015-09-07 at 1.31.47 PM.png"/>
+            <p:cNvPicPr>
+              <a:picLocks noChangeAspect="1"/>
+            </p:cNvPicPr>
+            <p:nvPr/>
+          </p:nvPicPr>
+          <p:blipFill rotWithShape="1">
+            <a:blip r:embed="rId3">
+              <a:extLst>
+                <a:ext uri="{28A0092B-C50C-407E-A947-70E740481C1C}">
+                  <a14:useLocalDpi xmlns:a14="http://schemas.microsoft.com/office/drawing/2010/main" val="0"/>
+                </a:ext>
+              </a:extLst>
+            </a:blip>
+            <a:srcRect l="37701" t="59894" r="39053" b="21826"/>
+            <a:stretch/>
+          </p:blipFill>
+          <p:spPr>
+            <a:xfrm>
+              <a:off x="5109354" y="2432689"/>
+              <a:ext cx="1055029" cy="536985"/>
+            </a:xfrm>
+            <a:prstGeom prst="rect">
+              <a:avLst/>
+            </a:prstGeom>
+          </p:spPr>
+        </p:pic>
+        <p:grpSp>
+          <p:nvGrpSpPr>
+            <p:cNvPr id="12" name="Group 11"/>
+            <p:cNvGrpSpPr/>
+            <p:nvPr/>
+          </p:nvGrpSpPr>
+          <p:grpSpPr>
+            <a:xfrm>
+              <a:off x="4938129" y="647195"/>
+              <a:ext cx="1421355" cy="1050758"/>
+              <a:chOff x="621765" y="498079"/>
+              <a:chExt cx="2968592" cy="2194577"/>
+            </a:xfrm>
+          </p:grpSpPr>
+          <p:pic>
+            <p:nvPicPr>
+              <p:cNvPr id="10" name="Picture 9" descr="Screen Shot 2015-09-07 at 12.29.10 PM.png"/>
+              <p:cNvPicPr>
+                <a:picLocks noChangeAspect="1"/>
+              </p:cNvPicPr>
+              <p:nvPr/>
+            </p:nvPicPr>
+            <p:blipFill rotWithShape="1">
+              <a:blip r:embed="rId2">
+                <a:extLst>
+                  <a:ext uri="{28A0092B-C50C-407E-A947-70E740481C1C}">
+                    <a14:useLocalDpi xmlns:a14="http://schemas.microsoft.com/office/drawing/2010/main" val="0"/>
+                  </a:ext>
+                </a:extLst>
+              </a:blip>
+              <a:srcRect l="57854" t="10890" b="20724"/>
+              <a:stretch/>
+            </p:blipFill>
+            <p:spPr>
+              <a:xfrm>
+                <a:off x="2071822" y="525155"/>
+                <a:ext cx="1518535" cy="2167501"/>
+              </a:xfrm>
+              <a:prstGeom prst="rect">
+                <a:avLst/>
+              </a:prstGeom>
+            </p:spPr>
+          </p:pic>
+          <p:pic>
+            <p:nvPicPr>
+              <p:cNvPr id="11" name="Picture 10" descr="Screen Shot 2015-09-07 at 12.29.10 PM.png"/>
+              <p:cNvPicPr>
+                <a:picLocks noChangeAspect="1"/>
+              </p:cNvPicPr>
+              <p:nvPr/>
+            </p:nvPicPr>
+            <p:blipFill rotWithShape="1">
+              <a:blip r:embed="rId2">
+                <a:extLst>
+                  <a:ext uri="{28A0092B-C50C-407E-A947-70E740481C1C}">
+                    <a14:useLocalDpi xmlns:a14="http://schemas.microsoft.com/office/drawing/2010/main" val="0"/>
+                  </a:ext>
+                </a:extLst>
+              </a:blip>
+              <a:srcRect l="3815" t="10889" r="52507" b="19870"/>
+              <a:stretch/>
+            </p:blipFill>
+            <p:spPr>
+              <a:xfrm>
+                <a:off x="621765" y="498079"/>
+                <a:ext cx="1573755" cy="2194577"/>
+              </a:xfrm>
+              <a:prstGeom prst="rect">
+                <a:avLst/>
+              </a:prstGeom>
+            </p:spPr>
+          </p:pic>
+        </p:grpSp>
+        <p:sp>
+          <p:nvSpPr>
+            <p:cNvPr id="14" name="Rectangle 13"/>
+            <p:cNvSpPr/>
+            <p:nvPr/>
+          </p:nvSpPr>
+          <p:spPr>
+            <a:xfrm>
+              <a:off x="5363817" y="1477685"/>
+              <a:ext cx="261712" cy="220268"/>
+            </a:xfrm>
+            <a:prstGeom prst="rect">
+              <a:avLst/>
+            </a:prstGeom>
+            <a:solidFill>
+              <a:srgbClr val="FFFFFF"/>
+            </a:solidFill>
+            <a:ln>
+              <a:solidFill>
+                <a:schemeClr val="bg1"/>
+              </a:solidFill>
+            </a:ln>
+            <a:effectLst/>
+          </p:spPr>
+          <p:style>
+            <a:lnRef idx="1">
+              <a:schemeClr val="accent1"/>
+            </a:lnRef>
+            <a:fillRef idx="3">
+              <a:schemeClr val="accent1"/>
+            </a:fillRef>
+            <a:effectRef idx="2">
+              <a:schemeClr val="accent1"/>
+            </a:effectRef>
+            <a:fontRef idx="minor">
+              <a:schemeClr val="lt1"/>
+            </a:fontRef>
+          </p:style>
+          <p:txBody>
+            <a:bodyPr rtlCol="0" anchor="ctr"/>
+            <a:lstStyle/>
+            <a:p>
+              <a:pPr algn="ctr"/>
+              <a:endParaRPr lang="en-US"/>
+            </a:p>
+          </p:txBody>
+        </p:sp>
+        <p:pic>
+          <p:nvPicPr>
+            <p:cNvPr id="13" name="Picture 12" descr="Screen Shot 2015-09-07 at 1.35.10 PM.png"/>
+            <p:cNvPicPr>
+              <a:picLocks noChangeAspect="1"/>
+            </p:cNvPicPr>
+            <p:nvPr/>
+          </p:nvPicPr>
+          <p:blipFill>
+            <a:blip r:embed="rId4">
+              <a:extLst>
+                <a:ext uri="{28A0092B-C50C-407E-A947-70E740481C1C}">
+                  <a14:useLocalDpi xmlns:a14="http://schemas.microsoft.com/office/drawing/2010/main" val="0"/>
+                </a:ext>
+              </a:extLst>
+            </a:blip>
+            <a:stretch>
+              <a:fillRect/>
+            </a:stretch>
+          </p:blipFill>
+          <p:spPr>
+            <a:xfrm>
+              <a:off x="5377585" y="1467359"/>
+              <a:ext cx="137673" cy="142836"/>
+            </a:xfrm>
+            <a:prstGeom prst="rect">
+              <a:avLst/>
+            </a:prstGeom>
+          </p:spPr>
+        </p:pic>
+        <p:pic>
+          <p:nvPicPr>
+            <p:cNvPr id="15" name="Picture 14" descr="Screen Shot 2015-09-07 at 1.54.57 PM.png"/>
+            <p:cNvPicPr>
+              <a:picLocks noChangeAspect="1"/>
+            </p:cNvPicPr>
+            <p:nvPr/>
+          </p:nvPicPr>
+          <p:blipFill>
+            <a:blip r:embed="rId5">
+              <a:extLst>
+                <a:ext uri="{28A0092B-C50C-407E-A947-70E740481C1C}">
+                  <a14:useLocalDpi xmlns:a14="http://schemas.microsoft.com/office/drawing/2010/main" val="0"/>
+                </a:ext>
+              </a:extLst>
+            </a:blip>
+            <a:stretch>
+              <a:fillRect/>
+            </a:stretch>
+          </p:blipFill>
+          <p:spPr>
+            <a:xfrm>
+              <a:off x="5285565" y="1998694"/>
+              <a:ext cx="660400" cy="571500"/>
+            </a:xfrm>
+            <a:prstGeom prst="rect">
+              <a:avLst/>
+            </a:prstGeom>
+          </p:spPr>
+        </p:pic>
+        <p:pic>
+          <p:nvPicPr>
+            <p:cNvPr id="16" name="Picture 15" descr="Screen Shot 2015-09-07 at 1.31.47 PM.png"/>
+            <p:cNvPicPr>
+              <a:picLocks noChangeAspect="1"/>
+            </p:cNvPicPr>
+            <p:nvPr/>
+          </p:nvPicPr>
+          <p:blipFill rotWithShape="1">
+            <a:blip r:embed="rId3">
+              <a:extLst>
+                <a:ext uri="{28A0092B-C50C-407E-A947-70E740481C1C}">
+                  <a14:useLocalDpi xmlns:a14="http://schemas.microsoft.com/office/drawing/2010/main" val="0"/>
+                </a:ext>
+              </a:extLst>
+            </a:blip>
+            <a:srcRect l="37701" t="81721" r="39053"/>
+            <a:stretch/>
+          </p:blipFill>
+          <p:spPr>
+            <a:xfrm>
+              <a:off x="5231705" y="2881559"/>
+              <a:ext cx="938265" cy="477555"/>
+            </a:xfrm>
+            <a:prstGeom prst="rect">
+              <a:avLst/>
+            </a:prstGeom>
+          </p:spPr>
+        </p:pic>
+        <p:sp>
+          <p:nvSpPr>
+            <p:cNvPr id="22" name="TextBox 21"/>
+            <p:cNvSpPr txBox="1"/>
+            <p:nvPr/>
+          </p:nvSpPr>
+          <p:spPr>
+            <a:xfrm>
+              <a:off x="5193296" y="236549"/>
+              <a:ext cx="919625" cy="369332"/>
+            </a:xfrm>
+            <a:prstGeom prst="rect">
+              <a:avLst/>
+            </a:prstGeom>
+            <a:noFill/>
+          </p:spPr>
+          <p:txBody>
+            <a:bodyPr wrap="none" rtlCol="0">
+              <a:spAutoFit/>
+            </a:bodyPr>
+            <a:lstStyle/>
+            <a:p>
+              <a:r>
+                <a:rPr lang="en-US" dirty="0" smtClean="0">
+                  <a:latin typeface="Avenir Book"/>
+                  <a:cs typeface="Avenir Book"/>
+                </a:rPr>
+                <a:t>Testing</a:t>
+              </a:r>
+              <a:endParaRPr lang="en-US" dirty="0">
+                <a:latin typeface="Avenir Book"/>
+                <a:cs typeface="Avenir Book"/>
+              </a:endParaRPr>
+            </a:p>
+          </p:txBody>
+        </p:sp>
+        <p:sp>
+          <p:nvSpPr>
+            <p:cNvPr id="25" name="TextBox 24"/>
+            <p:cNvSpPr txBox="1"/>
+            <p:nvPr/>
+          </p:nvSpPr>
+          <p:spPr>
+            <a:xfrm>
+              <a:off x="1489820" y="219509"/>
+              <a:ext cx="1000877" cy="369332"/>
+            </a:xfrm>
+            <a:prstGeom prst="rect">
+              <a:avLst/>
+            </a:prstGeom>
+            <a:noFill/>
+          </p:spPr>
+          <p:txBody>
+            <a:bodyPr wrap="none" rtlCol="0">
+              <a:spAutoFit/>
+            </a:bodyPr>
+            <a:lstStyle/>
+            <a:p>
+              <a:r>
+                <a:rPr lang="en-US" dirty="0" smtClean="0">
+                  <a:latin typeface="Avenir Book"/>
+                  <a:cs typeface="Avenir Book"/>
+                </a:rPr>
+                <a:t>Training</a:t>
+              </a:r>
+              <a:endParaRPr lang="en-US" dirty="0">
+                <a:latin typeface="Avenir Book"/>
+                <a:cs typeface="Avenir Book"/>
+              </a:endParaRPr>
+            </a:p>
+          </p:txBody>
+        </p:sp>
+        <p:sp>
+          <p:nvSpPr>
+            <p:cNvPr id="29" name="Rounded Rectangle 28"/>
+            <p:cNvSpPr/>
+            <p:nvPr/>
+          </p:nvSpPr>
+          <p:spPr>
+            <a:xfrm>
+              <a:off x="438582" y="579705"/>
+              <a:ext cx="3246074" cy="2736801"/>
+            </a:xfrm>
+            <a:prstGeom prst="roundRect">
+              <a:avLst/>
+            </a:prstGeom>
+            <a:noFill/>
+            <a:ln>
+              <a:solidFill>
+                <a:schemeClr val="tx1"/>
+              </a:solidFill>
+            </a:ln>
+          </p:spPr>
+          <p:style>
+            <a:lnRef idx="1">
+              <a:schemeClr val="accent1"/>
+            </a:lnRef>
+            <a:fillRef idx="3">
+              <a:schemeClr val="accent1"/>
+            </a:fillRef>
+            <a:effectRef idx="2">
+              <a:schemeClr val="accent1"/>
+            </a:effectRef>
+            <a:fontRef idx="minor">
+              <a:schemeClr val="lt1"/>
+            </a:fontRef>
+          </p:style>
+          <p:txBody>
+            <a:bodyPr rtlCol="0" anchor="ctr"/>
+            <a:lstStyle/>
+            <a:p>
+              <a:pPr algn="ctr"/>
+              <a:endParaRPr lang="en-US"/>
+            </a:p>
+          </p:txBody>
+        </p:sp>
+        <p:sp>
+          <p:nvSpPr>
+            <p:cNvPr id="30" name="Rounded Rectangle 29"/>
+            <p:cNvSpPr/>
+            <p:nvPr/>
+          </p:nvSpPr>
+          <p:spPr>
+            <a:xfrm>
+              <a:off x="4059534" y="585769"/>
+              <a:ext cx="3246074" cy="2736801"/>
+            </a:xfrm>
+            <a:prstGeom prst="roundRect">
+              <a:avLst/>
+            </a:prstGeom>
+            <a:noFill/>
+            <a:ln>
+              <a:solidFill>
+                <a:schemeClr val="tx1"/>
+              </a:solidFill>
+            </a:ln>
+          </p:spPr>
+          <p:style>
+            <a:lnRef idx="1">
+              <a:schemeClr val="accent1"/>
+            </a:lnRef>
+            <a:fillRef idx="3">
+              <a:schemeClr val="accent1"/>
+            </a:fillRef>
+            <a:effectRef idx="2">
+              <a:schemeClr val="accent1"/>
+            </a:effectRef>
+            <a:fontRef idx="minor">
+              <a:schemeClr val="lt1"/>
+            </a:fontRef>
+          </p:style>
+          <p:txBody>
+            <a:bodyPr rtlCol="0" anchor="ctr"/>
+            <a:lstStyle/>
+            <a:p>
+              <a:pPr algn="ctr"/>
+              <a:endParaRPr lang="en-US"/>
+            </a:p>
+          </p:txBody>
+        </p:sp>
       </p:grpSp>
-      <p:sp>
-        <p:nvSpPr>
-          <p:cNvPr id="14" name="Rectangle 13"/>
-          <p:cNvSpPr/>
-          <p:nvPr/>
-        </p:nvSpPr>
-        <p:spPr>
-          <a:xfrm>
-            <a:off x="5672084" y="1203245"/>
-            <a:ext cx="261712" cy="220268"/>
-          </a:xfrm>
-          <a:prstGeom prst="rect">
-            <a:avLst/>
-          </a:prstGeom>
-          <a:solidFill>
-            <a:srgbClr val="FFFFFF"/>
-          </a:solidFill>
-          <a:ln>
-            <a:solidFill>
-              <a:schemeClr val="bg1"/>
-            </a:solidFill>
-          </a:ln>
-          <a:effectLst/>
-        </p:spPr>
-        <p:style>
-          <a:lnRef idx="1">
-            <a:schemeClr val="accent1"/>
-          </a:lnRef>
-          <a:fillRef idx="3">
-            <a:schemeClr val="accent1"/>
-          </a:fillRef>
-          <a:effectRef idx="2">
-            <a:schemeClr val="accent1"/>
-          </a:effectRef>
-          <a:fontRef idx="minor">
-            <a:schemeClr val="lt1"/>
-          </a:fontRef>
-        </p:style>
-        <p:txBody>
-          <a:bodyPr rtlCol="0" anchor="ctr"/>
-          <a:lstStyle/>
-          <a:p>
-            <a:pPr algn="ctr"/>
-            <a:endParaRPr lang="en-US"/>
-          </a:p>
-        </p:txBody>
-      </p:sp>
-      <p:pic>
-        <p:nvPicPr>
-          <p:cNvPr id="13" name="Picture 12" descr="Screen Shot 2015-09-07 at 1.35.10 PM.png"/>
-          <p:cNvPicPr>
-            <a:picLocks noChangeAspect="1"/>
-          </p:cNvPicPr>
-          <p:nvPr/>
-        </p:nvPicPr>
-        <p:blipFill>
-          <a:blip r:embed="rId4">
-            <a:extLst>
-              <a:ext uri="{28A0092B-C50C-407E-A947-70E740481C1C}">
-                <a14:useLocalDpi xmlns:a14="http://schemas.microsoft.com/office/drawing/2010/main" val="0"/>
-              </a:ext>
-            </a:extLst>
-          </a:blip>
-          <a:stretch>
-            <a:fillRect/>
-          </a:stretch>
-        </p:blipFill>
-        <p:spPr>
-          <a:xfrm>
-            <a:off x="5685852" y="1192919"/>
-            <a:ext cx="137673" cy="142836"/>
-          </a:xfrm>
-          <a:prstGeom prst="rect">
-            <a:avLst/>
-          </a:prstGeom>
-        </p:spPr>
-      </p:pic>
-      <p:pic>
-        <p:nvPicPr>
-          <p:cNvPr id="15" name="Picture 14" descr="Screen Shot 2015-09-07 at 1.54.57 PM.png"/>
-          <p:cNvPicPr>
-            <a:picLocks noChangeAspect="1"/>
-          </p:cNvPicPr>
-          <p:nvPr/>
-        </p:nvPicPr>
-        <p:blipFill>
-          <a:blip r:embed="rId5">
-            <a:extLst>
-              <a:ext uri="{28A0092B-C50C-407E-A947-70E740481C1C}">
-                <a14:useLocalDpi xmlns:a14="http://schemas.microsoft.com/office/drawing/2010/main" val="0"/>
-              </a:ext>
-            </a:extLst>
-          </a:blip>
-          <a:stretch>
-            <a:fillRect/>
-          </a:stretch>
-        </p:blipFill>
-        <p:spPr>
-          <a:xfrm>
-            <a:off x="5593832" y="1724254"/>
-            <a:ext cx="660400" cy="571500"/>
-          </a:xfrm>
-          <a:prstGeom prst="rect">
-            <a:avLst/>
-          </a:prstGeom>
-        </p:spPr>
-      </p:pic>
-      <p:pic>
-        <p:nvPicPr>
-          <p:cNvPr id="16" name="Picture 15" descr="Screen Shot 2015-09-07 at 1.31.47 PM.png"/>
-          <p:cNvPicPr>
-            <a:picLocks noChangeAspect="1"/>
-          </p:cNvPicPr>
-          <p:nvPr/>
-        </p:nvPicPr>
-        <p:blipFill rotWithShape="1">
-          <a:blip r:embed="rId3">
-            <a:extLst>
-              <a:ext uri="{28A0092B-C50C-407E-A947-70E740481C1C}">
-                <a14:useLocalDpi xmlns:a14="http://schemas.microsoft.com/office/drawing/2010/main" val="0"/>
-              </a:ext>
-            </a:extLst>
-          </a:blip>
-          <a:srcRect l="37701" t="81721" r="39053"/>
-          <a:stretch/>
-        </p:blipFill>
-        <p:spPr>
-          <a:xfrm>
-            <a:off x="5539972" y="2607119"/>
-            <a:ext cx="938265" cy="477555"/>
-          </a:xfrm>
-          <a:prstGeom prst="rect">
-            <a:avLst/>
-          </a:prstGeom>
-        </p:spPr>
-      </p:pic>
     </p:spTree>
     <p:extLst>
       <p:ext uri="{BB962C8B-B14F-4D97-AF65-F5344CB8AC3E}">

</xml_diff>